<commit_message>
Demo update to clarify ScienceBase IDs
</commit_message>
<xml_diff>
--- a/etc/sciencebase/SBSync_Demo.pptx
+++ b/etc/sciencebase/SBSync_Demo.pptx
@@ -264,14 +264,14 @@
           <a:effectLst/>
           <a:extLst>
             <a:ext uri="{909E8E84-426E-40dd-AFC4-6F175D3DCCD1}">
-              <a14:hiddenFill xmlns="" xmlns:a14="http://schemas.microsoft.com/office/drawing/2010/main">
+              <a14:hiddenFill xmlns:a14="http://schemas.microsoft.com/office/drawing/2010/main" xmlns="">
                 <a:solidFill>
                   <a:schemeClr val="accent1"/>
                 </a:solidFill>
               </a14:hiddenFill>
             </a:ext>
             <a:ext uri="{91240B29-F687-4f45-9708-019B960494DF}">
-              <a14:hiddenLine xmlns="" xmlns:a14="http://schemas.microsoft.com/office/drawing/2010/main" w="12700">
+              <a14:hiddenLine xmlns:a14="http://schemas.microsoft.com/office/drawing/2010/main" xmlns="" w="12700">
                 <a:solidFill>
                   <a:schemeClr val="tx1"/>
                 </a:solidFill>
@@ -281,7 +281,7 @@
               </a14:hiddenLine>
             </a:ext>
             <a:ext uri="{AF507438-7753-43e0-B8FC-AC1667EBCBE1}">
-              <a14:hiddenEffects xmlns="" xmlns:a14="http://schemas.microsoft.com/office/drawing/2010/main">
+              <a14:hiddenEffects xmlns:a14="http://schemas.microsoft.com/office/drawing/2010/main" xmlns="">
                 <a:effectLst>
                   <a:outerShdw blurRad="63500" dist="38099" dir="2700000" algn="ctr" rotWithShape="0">
                     <a:schemeClr val="bg2">
@@ -292,7 +292,7 @@
               </a14:hiddenEffects>
             </a:ext>
             <a:ext uri="{FAA26D3D-D897-4be2-8F04-BA451C77F1D7}">
-              <ma14:placeholderFlag xmlns="" xmlns:ma14="http://schemas.microsoft.com/office/mac/drawingml/2011/main" val="1"/>
+              <ma14:placeholderFlag xmlns:ma14="http://schemas.microsoft.com/office/mac/drawingml/2011/main" xmlns="" val="1"/>
             </a:ext>
           </a:extLst>
         </p:spPr>
@@ -370,12 +370,12 @@
           <a:effectLst/>
           <a:extLst>
             <a:ext uri="{909E8E84-426E-40dd-AFC4-6F175D3DCCD1}">
-              <a14:hiddenFill xmlns="" xmlns:a14="http://schemas.microsoft.com/office/drawing/2010/main">
+              <a14:hiddenFill xmlns:a14="http://schemas.microsoft.com/office/drawing/2010/main" xmlns="">
                 <a:noFill/>
               </a14:hiddenFill>
             </a:ext>
             <a:ext uri="{AF507438-7753-43e0-B8FC-AC1667EBCBE1}">
-              <a14:hiddenEffects xmlns="" xmlns:a14="http://schemas.microsoft.com/office/drawing/2010/main">
+              <a14:hiddenEffects xmlns:a14="http://schemas.microsoft.com/office/drawing/2010/main" xmlns="">
                 <a:effectLst>
                   <a:outerShdw blurRad="63500" dist="38099" dir="2700000" algn="ctr" rotWithShape="0">
                     <a:srgbClr val="000000">
@@ -386,7 +386,7 @@
               </a14:hiddenEffects>
             </a:ext>
             <a:ext uri="{53640926-AAD7-44d8-BBD7-CCE9431645EC}">
-              <a14:shadowObscured xmlns="" xmlns:a14="http://schemas.microsoft.com/office/drawing/2010/main" val="1"/>
+              <a14:shadowObscured xmlns:a14="http://schemas.microsoft.com/office/drawing/2010/main" xmlns="" val="1"/>
             </a:ext>
           </a:extLst>
         </p:spPr>
@@ -771,14 +771,14 @@
           </a:ln>
           <a:extLst>
             <a:ext uri="{909E8E84-426E-40dd-AFC4-6F175D3DCCD1}">
-              <a14:hiddenFill xmlns="" xmlns:a14="http://schemas.microsoft.com/office/drawing/2010/main">
+              <a14:hiddenFill xmlns:a14="http://schemas.microsoft.com/office/drawing/2010/main" xmlns="">
                 <a:solidFill>
                   <a:srgbClr val="FFFFFF"/>
                 </a:solidFill>
               </a14:hiddenFill>
             </a:ext>
             <a:ext uri="{91240B29-F687-4f45-9708-019B960494DF}">
-              <a14:hiddenLine xmlns="" xmlns:a14="http://schemas.microsoft.com/office/drawing/2010/main" w="9525">
+              <a14:hiddenLine xmlns:a14="http://schemas.microsoft.com/office/drawing/2010/main" xmlns="" w="9525">
                 <a:solidFill>
                   <a:srgbClr val="000000"/>
                 </a:solidFill>
@@ -819,14 +819,14 @@
           <a:effectLst/>
           <a:extLst>
             <a:ext uri="{909E8E84-426E-40dd-AFC4-6F175D3DCCD1}">
-              <a14:hiddenFill xmlns="" xmlns:a14="http://schemas.microsoft.com/office/drawing/2010/main">
+              <a14:hiddenFill xmlns:a14="http://schemas.microsoft.com/office/drawing/2010/main" xmlns="">
                 <a:solidFill>
                   <a:schemeClr val="accent1"/>
                 </a:solidFill>
               </a14:hiddenFill>
             </a:ext>
             <a:ext uri="{91240B29-F687-4f45-9708-019B960494DF}">
-              <a14:hiddenLine xmlns="" xmlns:a14="http://schemas.microsoft.com/office/drawing/2010/main" w="12700">
+              <a14:hiddenLine xmlns:a14="http://schemas.microsoft.com/office/drawing/2010/main" xmlns="" w="12700">
                 <a:solidFill>
                   <a:schemeClr val="tx1"/>
                 </a:solidFill>
@@ -836,7 +836,7 @@
               </a14:hiddenLine>
             </a:ext>
             <a:ext uri="{AF507438-7753-43e0-B8FC-AC1667EBCBE1}">
-              <a14:hiddenEffects xmlns="" xmlns:a14="http://schemas.microsoft.com/office/drawing/2010/main">
+              <a14:hiddenEffects xmlns:a14="http://schemas.microsoft.com/office/drawing/2010/main" xmlns="">
                 <a:effectLst>
                   <a:outerShdw blurRad="63500" dist="38099" dir="2700000" algn="ctr" rotWithShape="0">
                     <a:schemeClr val="bg2">
@@ -2475,14 +2475,14 @@
           <a:effectLst/>
           <a:extLst>
             <a:ext uri="{909E8E84-426E-40dd-AFC4-6F175D3DCCD1}">
-              <a14:hiddenFill xmlns="" xmlns:a14="http://schemas.microsoft.com/office/drawing/2010/main">
+              <a14:hiddenFill xmlns:a14="http://schemas.microsoft.com/office/drawing/2010/main" xmlns="">
                 <a:solidFill>
                   <a:schemeClr val="accent1"/>
                 </a:solidFill>
               </a14:hiddenFill>
             </a:ext>
             <a:ext uri="{91240B29-F687-4f45-9708-019B960494DF}">
-              <a14:hiddenLine xmlns="" xmlns:a14="http://schemas.microsoft.com/office/drawing/2010/main" w="12700">
+              <a14:hiddenLine xmlns:a14="http://schemas.microsoft.com/office/drawing/2010/main" xmlns="" w="12700">
                 <a:solidFill>
                   <a:schemeClr val="tx1"/>
                 </a:solidFill>
@@ -2492,7 +2492,7 @@
               </a14:hiddenLine>
             </a:ext>
             <a:ext uri="{AF507438-7753-43e0-B8FC-AC1667EBCBE1}">
-              <a14:hiddenEffects xmlns="" xmlns:a14="http://schemas.microsoft.com/office/drawing/2010/main">
+              <a14:hiddenEffects xmlns:a14="http://schemas.microsoft.com/office/drawing/2010/main" xmlns="">
                 <a:effectLst>
                   <a:outerShdw blurRad="63500" dist="38099" dir="2700000" algn="ctr" rotWithShape="0">
                     <a:schemeClr val="bg2">
@@ -2503,7 +2503,7 @@
               </a14:hiddenEffects>
             </a:ext>
             <a:ext uri="{FAA26D3D-D897-4be2-8F04-BA451C77F1D7}">
-              <ma14:placeholderFlag xmlns="" xmlns:ma14="http://schemas.microsoft.com/office/mac/drawingml/2011/main" val="1"/>
+              <ma14:placeholderFlag xmlns:ma14="http://schemas.microsoft.com/office/mac/drawingml/2011/main" xmlns="" val="1"/>
             </a:ext>
           </a:extLst>
         </p:spPr>
@@ -2548,14 +2548,14 @@
           <a:effectLst/>
           <a:extLst>
             <a:ext uri="{909E8E84-426E-40dd-AFC4-6F175D3DCCD1}">
-              <a14:hiddenFill xmlns="" xmlns:a14="http://schemas.microsoft.com/office/drawing/2010/main">
+              <a14:hiddenFill xmlns:a14="http://schemas.microsoft.com/office/drawing/2010/main" xmlns="">
                 <a:solidFill>
                   <a:schemeClr val="accent1"/>
                 </a:solidFill>
               </a14:hiddenFill>
             </a:ext>
             <a:ext uri="{91240B29-F687-4f45-9708-019B960494DF}">
-              <a14:hiddenLine xmlns="" xmlns:a14="http://schemas.microsoft.com/office/drawing/2010/main" w="12700">
+              <a14:hiddenLine xmlns:a14="http://schemas.microsoft.com/office/drawing/2010/main" xmlns="" w="12700">
                 <a:solidFill>
                   <a:schemeClr val="tx1"/>
                 </a:solidFill>
@@ -2565,7 +2565,7 @@
               </a14:hiddenLine>
             </a:ext>
             <a:ext uri="{AF507438-7753-43e0-B8FC-AC1667EBCBE1}">
-              <a14:hiddenEffects xmlns="" xmlns:a14="http://schemas.microsoft.com/office/drawing/2010/main">
+              <a14:hiddenEffects xmlns:a14="http://schemas.microsoft.com/office/drawing/2010/main" xmlns="">
                 <a:effectLst>
                   <a:outerShdw blurRad="63500" dist="38099" dir="2700000" algn="ctr" rotWithShape="0">
                     <a:schemeClr val="bg2">
@@ -2576,7 +2576,7 @@
               </a14:hiddenEffects>
             </a:ext>
             <a:ext uri="{FAA26D3D-D897-4be2-8F04-BA451C77F1D7}">
-              <ma14:placeholderFlag xmlns="" xmlns:ma14="http://schemas.microsoft.com/office/mac/drawingml/2011/main" val="1"/>
+              <ma14:placeholderFlag xmlns:ma14="http://schemas.microsoft.com/office/mac/drawingml/2011/main" xmlns="" val="1"/>
             </a:ext>
           </a:extLst>
         </p:spPr>
@@ -2666,14 +2666,14 @@
           </a:ln>
           <a:extLst>
             <a:ext uri="{909E8E84-426E-40dd-AFC4-6F175D3DCCD1}">
-              <a14:hiddenFill xmlns="" xmlns:a14="http://schemas.microsoft.com/office/drawing/2010/main">
+              <a14:hiddenFill xmlns:a14="http://schemas.microsoft.com/office/drawing/2010/main" xmlns="">
                 <a:solidFill>
                   <a:srgbClr val="FFFFFF"/>
                 </a:solidFill>
               </a14:hiddenFill>
             </a:ext>
             <a:ext uri="{91240B29-F687-4f45-9708-019B960494DF}">
-              <a14:hiddenLine xmlns="" xmlns:a14="http://schemas.microsoft.com/office/drawing/2010/main" w="9525">
+              <a14:hiddenLine xmlns:a14="http://schemas.microsoft.com/office/drawing/2010/main" xmlns="" w="9525">
                 <a:solidFill>
                   <a:srgbClr val="000000"/>
                 </a:solidFill>
@@ -4185,14 +4185,14 @@
           <a:effectLst/>
           <a:extLst>
             <a:ext uri="{909E8E84-426E-40dd-AFC4-6F175D3DCCD1}">
-              <a14:hiddenFill xmlns="" xmlns:a14="http://schemas.microsoft.com/office/drawing/2010/main">
+              <a14:hiddenFill xmlns:a14="http://schemas.microsoft.com/office/drawing/2010/main" xmlns="">
                 <a:solidFill>
                   <a:schemeClr val="accent1"/>
                 </a:solidFill>
               </a14:hiddenFill>
             </a:ext>
             <a:ext uri="{91240B29-F687-4f45-9708-019B960494DF}">
-              <a14:hiddenLine xmlns="" xmlns:a14="http://schemas.microsoft.com/office/drawing/2010/main" w="12700">
+              <a14:hiddenLine xmlns:a14="http://schemas.microsoft.com/office/drawing/2010/main" xmlns="" w="12700">
                 <a:solidFill>
                   <a:schemeClr val="tx1"/>
                 </a:solidFill>
@@ -4202,7 +4202,7 @@
               </a14:hiddenLine>
             </a:ext>
             <a:ext uri="{AF507438-7753-43e0-B8FC-AC1667EBCBE1}">
-              <a14:hiddenEffects xmlns="" xmlns:a14="http://schemas.microsoft.com/office/drawing/2010/main">
+              <a14:hiddenEffects xmlns:a14="http://schemas.microsoft.com/office/drawing/2010/main" xmlns="">
                 <a:effectLst>
                   <a:outerShdw blurRad="63500" dist="38099" dir="2700000" algn="ctr" rotWithShape="0">
                     <a:schemeClr val="bg2">
@@ -4213,7 +4213,7 @@
               </a14:hiddenEffects>
             </a:ext>
             <a:ext uri="{FAA26D3D-D897-4be2-8F04-BA451C77F1D7}">
-              <ma14:placeholderFlag xmlns="" xmlns:ma14="http://schemas.microsoft.com/office/mac/drawingml/2011/main" val="1"/>
+              <ma14:placeholderFlag xmlns:ma14="http://schemas.microsoft.com/office/mac/drawingml/2011/main" xmlns="" val="1"/>
             </a:ext>
           </a:extLst>
         </p:spPr>
@@ -4743,14 +4743,14 @@
           <a:effectLst/>
           <a:extLst>
             <a:ext uri="{909E8E84-426E-40dd-AFC4-6F175D3DCCD1}">
-              <a14:hiddenFill xmlns="" xmlns:a14="http://schemas.microsoft.com/office/drawing/2010/main">
+              <a14:hiddenFill xmlns:a14="http://schemas.microsoft.com/office/drawing/2010/main" xmlns="">
                 <a:solidFill>
                   <a:schemeClr val="accent1"/>
                 </a:solidFill>
               </a14:hiddenFill>
             </a:ext>
             <a:ext uri="{91240B29-F687-4f45-9708-019B960494DF}">
-              <a14:hiddenLine xmlns="" xmlns:a14="http://schemas.microsoft.com/office/drawing/2010/main" w="12700">
+              <a14:hiddenLine xmlns:a14="http://schemas.microsoft.com/office/drawing/2010/main" xmlns="" w="12700">
                 <a:solidFill>
                   <a:schemeClr val="tx1"/>
                 </a:solidFill>
@@ -4760,7 +4760,7 @@
               </a14:hiddenLine>
             </a:ext>
             <a:ext uri="{AF507438-7753-43e0-B8FC-AC1667EBCBE1}">
-              <a14:hiddenEffects xmlns="" xmlns:a14="http://schemas.microsoft.com/office/drawing/2010/main">
+              <a14:hiddenEffects xmlns:a14="http://schemas.microsoft.com/office/drawing/2010/main" xmlns="">
                 <a:effectLst>
                   <a:outerShdw blurRad="63500" dist="38099" dir="2700000" algn="ctr" rotWithShape="0">
                     <a:schemeClr val="bg2">
@@ -4771,7 +4771,7 @@
               </a14:hiddenEffects>
             </a:ext>
             <a:ext uri="{FAA26D3D-D897-4be2-8F04-BA451C77F1D7}">
-              <ma14:placeholderFlag xmlns="" xmlns:ma14="http://schemas.microsoft.com/office/mac/drawingml/2011/main" val="1"/>
+              <ma14:placeholderFlag xmlns:ma14="http://schemas.microsoft.com/office/mac/drawingml/2011/main" xmlns="" val="1"/>
             </a:ext>
           </a:extLst>
         </p:spPr>
@@ -5260,14 +5260,14 @@
           <a:effectLst/>
           <a:extLst>
             <a:ext uri="{909E8E84-426E-40dd-AFC4-6F175D3DCCD1}">
-              <a14:hiddenFill xmlns="" xmlns:a14="http://schemas.microsoft.com/office/drawing/2010/main">
+              <a14:hiddenFill xmlns:a14="http://schemas.microsoft.com/office/drawing/2010/main" xmlns="">
                 <a:solidFill>
                   <a:schemeClr val="accent1"/>
                 </a:solidFill>
               </a14:hiddenFill>
             </a:ext>
             <a:ext uri="{91240B29-F687-4f45-9708-019B960494DF}">
-              <a14:hiddenLine xmlns="" xmlns:a14="http://schemas.microsoft.com/office/drawing/2010/main" w="12700">
+              <a14:hiddenLine xmlns:a14="http://schemas.microsoft.com/office/drawing/2010/main" xmlns="" w="12700">
                 <a:solidFill>
                   <a:schemeClr val="tx1"/>
                 </a:solidFill>
@@ -5277,7 +5277,7 @@
               </a14:hiddenLine>
             </a:ext>
             <a:ext uri="{AF507438-7753-43e0-B8FC-AC1667EBCBE1}">
-              <a14:hiddenEffects xmlns="" xmlns:a14="http://schemas.microsoft.com/office/drawing/2010/main">
+              <a14:hiddenEffects xmlns:a14="http://schemas.microsoft.com/office/drawing/2010/main" xmlns="">
                 <a:effectLst>
                   <a:outerShdw blurRad="63500" dist="38099" dir="2700000" algn="ctr" rotWithShape="0">
                     <a:schemeClr val="bg2">
@@ -5288,7 +5288,7 @@
               </a14:hiddenEffects>
             </a:ext>
             <a:ext uri="{FAA26D3D-D897-4be2-8F04-BA451C77F1D7}">
-              <ma14:placeholderFlag xmlns="" xmlns:ma14="http://schemas.microsoft.com/office/mac/drawingml/2011/main" val="1"/>
+              <ma14:placeholderFlag xmlns:ma14="http://schemas.microsoft.com/office/mac/drawingml/2011/main" xmlns="" val="1"/>
             </a:ext>
           </a:extLst>
         </p:spPr>
@@ -6183,22 +6183,100 @@
             <p:ph idx="1"/>
           </p:nvPr>
         </p:nvSpPr>
-        <p:spPr/>
+        <p:spPr>
+          <a:xfrm>
+            <a:off x="381000" y="1181100"/>
+            <a:ext cx="8305800" cy="4495800"/>
+          </a:xfrm>
+        </p:spPr>
         <p:txBody>
           <a:bodyPr/>
           <a:lstStyle/>
           <a:p>
             <a:r>
-              <a:rPr lang="en-US" sz="2000" dirty="0"/>
+              <a:rPr lang="en-US" sz="1800" dirty="0"/>
               <a:t>Enter </a:t>
             </a:r>
             <a:r>
-              <a:rPr lang="en-US" sz="2000" dirty="0" err="1"/>
+              <a:rPr lang="en-US" sz="1800" dirty="0" err="1"/>
               <a:t>ScienceBase</a:t>
             </a:r>
             <a:r>
-              <a:rPr lang="en-US" sz="2000" dirty="0"/>
+              <a:rPr lang="en-US" sz="1800" dirty="0"/>
               <a:t> folder ID of the root folder you want to connect to</a:t>
+            </a:r>
+          </a:p>
+          <a:p>
+            <a:pPr lvl="1"/>
+            <a:r>
+              <a:rPr lang="en-US" sz="1600" dirty="0"/>
+              <a:t>The </a:t>
+            </a:r>
+            <a:r>
+              <a:rPr lang="en-US" sz="1600" dirty="0" err="1"/>
+              <a:t>ScienceBase</a:t>
+            </a:r>
+            <a:r>
+              <a:rPr lang="en-US" sz="1600" dirty="0"/>
+              <a:t> folder ID can be found by accessing the folder you want on the </a:t>
+            </a:r>
+            <a:r>
+              <a:rPr lang="en-US" sz="1600" dirty="0" err="1"/>
+              <a:t>ScienceBase</a:t>
+            </a:r>
+            <a:r>
+              <a:rPr lang="en-US" sz="1600" dirty="0"/>
+              <a:t> website and looking at the last part of the URL</a:t>
+            </a:r>
+          </a:p>
+          <a:p>
+            <a:pPr lvl="2"/>
+            <a:r>
+              <a:rPr lang="en-US" sz="1400" dirty="0"/>
+              <a:t>For example, for </a:t>
+            </a:r>
+            <a:r>
+              <a:rPr lang="en-US" sz="1400"/>
+              <a:t>the URL</a:t>
+            </a:r>
+            <a:r>
+              <a:rPr lang="en-US" sz="1400" dirty="0"/>
+              <a:t>: </a:t>
+            </a:r>
+            <a:r>
+              <a:rPr lang="en-US" sz="1400" dirty="0">
+                <a:solidFill>
+                  <a:schemeClr val="tx1"/>
+                </a:solidFill>
+                <a:hlinkClick r:id="rId2">
+                  <a:extLst>
+                    <a:ext uri="{A12FA001-AC4F-418D-AE19-62706E023703}">
+                      <ahyp:hlinkClr xmlns:ahyp="http://schemas.microsoft.com/office/drawing/2018/hyperlinkcolor" val="tx"/>
+                    </a:ext>
+                  </a:extLst>
+                </a:hlinkClick>
+              </a:rPr>
+              <a:t>https://www.sciencebase.gov/catalog/item/5fbe75fad34e4b9faad7e8a1</a:t>
+            </a:r>
+            <a:r>
+              <a:rPr lang="en-US" sz="1400" dirty="0">
+                <a:solidFill>
+                  <a:schemeClr val="tx1"/>
+                </a:solidFill>
+              </a:rPr>
+              <a:t> </a:t>
+            </a:r>
+            <a:r>
+              <a:rPr lang="en-US" sz="1400" dirty="0"/>
+              <a:t>the </a:t>
+            </a:r>
+            <a:r>
+              <a:rPr lang="en-US" sz="1400" dirty="0" err="1"/>
+              <a:t>ScienceBase</a:t>
+            </a:r>
+            <a:r>
+              <a:rPr lang="en-US" sz="1400" dirty="0"/>
+              <a:t> folder ID is “5fbe75fad34e4b9faad7e8a1” without the quotes.</a:t>
             </a:r>
           </a:p>
           <a:p>
@@ -6210,26 +6288,26 @@
           </a:p>
           <a:p>
             <a:r>
-              <a:rPr lang="en-US" sz="2000" dirty="0"/>
+              <a:rPr lang="en-US" sz="1800" dirty="0"/>
               <a:t>Enter your username that you use to connect to </a:t>
             </a:r>
             <a:r>
-              <a:rPr lang="en-US" sz="2000" dirty="0" err="1"/>
+              <a:rPr lang="en-US" sz="1800" dirty="0" err="1"/>
               <a:t>ScienceBase</a:t>
             </a:r>
-            <a:endParaRPr lang="en-US" sz="2000" dirty="0"/>
-          </a:p>
-          <a:p>
-            <a:r>
-              <a:rPr lang="en-US" sz="2000" dirty="0"/>
+            <a:endParaRPr lang="en-US" sz="1800" dirty="0"/>
+          </a:p>
+          <a:p>
+            <a:r>
+              <a:rPr lang="en-US" sz="1800" dirty="0"/>
               <a:t>Enter the local folder path where you want to store the </a:t>
             </a:r>
             <a:r>
-              <a:rPr lang="en-US" sz="2000" dirty="0" err="1"/>
+              <a:rPr lang="en-US" sz="1800" dirty="0" err="1"/>
               <a:t>ScienceBase</a:t>
             </a:r>
             <a:r>
-              <a:rPr lang="en-US" sz="2000" dirty="0"/>
+              <a:rPr lang="en-US" sz="1800" dirty="0"/>
               <a:t> directory tree</a:t>
             </a:r>
           </a:p>
@@ -6242,27 +6320,27 @@
           </a:p>
           <a:p>
             <a:r>
-              <a:rPr lang="en-US" sz="2000" dirty="0"/>
+              <a:rPr lang="en-US" sz="1800" dirty="0"/>
               <a:t>Click “Connect”</a:t>
             </a:r>
           </a:p>
           <a:p>
             <a:r>
-              <a:rPr lang="en-US" sz="2000" dirty="0"/>
+              <a:rPr lang="en-US" sz="1800" dirty="0"/>
               <a:t>Enter your </a:t>
             </a:r>
             <a:r>
-              <a:rPr lang="en-US" sz="2000" dirty="0" err="1"/>
+              <a:rPr lang="en-US" sz="1800" dirty="0" err="1"/>
               <a:t>ScienceBase</a:t>
             </a:r>
             <a:r>
-              <a:rPr lang="en-US" sz="2000" dirty="0"/>
+              <a:rPr lang="en-US" sz="1800" dirty="0"/>
               <a:t> password when prompted</a:t>
             </a:r>
           </a:p>
           <a:p>
             <a:r>
-              <a:rPr lang="en-US" sz="2000" dirty="0"/>
+              <a:rPr lang="en-US" sz="1800" dirty="0"/>
               <a:t>Folder ID, username, and local folder path stored in _sbtv_settings.txt and automatically entered for you whenever you run sbtreeview.py from the current location</a:t>
             </a:r>
           </a:p>
@@ -7214,7 +7292,7 @@
         <a:effectLst/>
         <a:extLst>
           <a:ext uri="{AF507438-7753-43e0-B8FC-AC1667EBCBE1}">
-            <a14:hiddenEffects xmlns="" xmlns:a14="http://schemas.microsoft.com/office/drawing/2010/main">
+            <a14:hiddenEffects xmlns:a14="http://schemas.microsoft.com/office/drawing/2010/main" xmlns="">
               <a:effectLst>
                 <a:outerShdw blurRad="63500" dist="38099" dir="2700000" algn="ctr" rotWithShape="0">
                   <a:schemeClr val="bg2">
@@ -7290,7 +7368,7 @@
         <a:effectLst/>
         <a:extLst>
           <a:ext uri="{AF507438-7753-43e0-B8FC-AC1667EBCBE1}">
-            <a14:hiddenEffects xmlns="" xmlns:a14="http://schemas.microsoft.com/office/drawing/2010/main">
+            <a14:hiddenEffects xmlns:a14="http://schemas.microsoft.com/office/drawing/2010/main" xmlns="">
               <a:effectLst>
                 <a:outerShdw blurRad="63500" dist="38099" dir="2700000" algn="ctr" rotWithShape="0">
                   <a:schemeClr val="bg2">

</xml_diff>